<commit_message>
documentation: ER and logical design
</commit_message>
<xml_diff>
--- a/Presentation.pptx
+++ b/Presentation.pptx
@@ -430,7 +430,7 @@
           <a:p>
             <a:fld id="{BC687BD1-250A-4D3C-93F8-CE8E4620A598}" type="slidenum">
               <a:rPr lang="en-GB" smtClean="0"/>
-              <a:t>‹#›</a:t>
+              <a:t>‹N›</a:t>
             </a:fld>
             <a:endParaRPr lang="en-GB" dirty="0"/>
           </a:p>
@@ -796,7 +796,7 @@
           <a:p>
             <a:fld id="{2D2B23BE-89C9-4E17-8330-1D0EE89529DF}" type="slidenum">
               <a:rPr lang="en-GB" smtClean="0"/>
-              <a:t>‹#›</a:t>
+              <a:t>‹N›</a:t>
             </a:fld>
             <a:endParaRPr lang="en-GB" dirty="0"/>
           </a:p>
@@ -966,7 +966,7 @@
           <a:p>
             <a:fld id="{2D2B23BE-89C9-4E17-8330-1D0EE89529DF}" type="slidenum">
               <a:rPr lang="en-GB" smtClean="0"/>
-              <a:t>‹#›</a:t>
+              <a:t>‹N›</a:t>
             </a:fld>
             <a:endParaRPr lang="en-GB" dirty="0"/>
           </a:p>
@@ -1146,7 +1146,7 @@
           <a:p>
             <a:fld id="{2D2B23BE-89C9-4E17-8330-1D0EE89529DF}" type="slidenum">
               <a:rPr lang="en-GB" smtClean="0"/>
-              <a:t>‹#›</a:t>
+              <a:t>‹N›</a:t>
             </a:fld>
             <a:endParaRPr lang="en-GB" dirty="0"/>
           </a:p>
@@ -1316,7 +1316,7 @@
           <a:p>
             <a:fld id="{2D2B23BE-89C9-4E17-8330-1D0EE89529DF}" type="slidenum">
               <a:rPr lang="en-GB" smtClean="0"/>
-              <a:t>‹#›</a:t>
+              <a:t>‹N›</a:t>
             </a:fld>
             <a:endParaRPr lang="en-GB" dirty="0"/>
           </a:p>
@@ -1560,7 +1560,7 @@
           <a:p>
             <a:fld id="{2D2B23BE-89C9-4E17-8330-1D0EE89529DF}" type="slidenum">
               <a:rPr lang="en-GB" smtClean="0"/>
-              <a:t>‹#›</a:t>
+              <a:t>‹N›</a:t>
             </a:fld>
             <a:endParaRPr lang="en-GB" dirty="0"/>
           </a:p>
@@ -1792,7 +1792,7 @@
           <a:p>
             <a:fld id="{2D2B23BE-89C9-4E17-8330-1D0EE89529DF}" type="slidenum">
               <a:rPr lang="en-GB" smtClean="0"/>
-              <a:t>‹#›</a:t>
+              <a:t>‹N›</a:t>
             </a:fld>
             <a:endParaRPr lang="en-GB" dirty="0"/>
           </a:p>
@@ -2159,7 +2159,7 @@
           <a:p>
             <a:fld id="{2D2B23BE-89C9-4E17-8330-1D0EE89529DF}" type="slidenum">
               <a:rPr lang="en-GB" smtClean="0"/>
-              <a:t>‹#›</a:t>
+              <a:t>‹N›</a:t>
             </a:fld>
             <a:endParaRPr lang="en-GB" dirty="0"/>
           </a:p>
@@ -2277,7 +2277,7 @@
           <a:p>
             <a:fld id="{2D2B23BE-89C9-4E17-8330-1D0EE89529DF}" type="slidenum">
               <a:rPr lang="en-GB" smtClean="0"/>
-              <a:t>‹#›</a:t>
+              <a:t>‹N›</a:t>
             </a:fld>
             <a:endParaRPr lang="en-GB" dirty="0"/>
           </a:p>
@@ -2372,7 +2372,7 @@
           <a:p>
             <a:fld id="{2D2B23BE-89C9-4E17-8330-1D0EE89529DF}" type="slidenum">
               <a:rPr lang="en-GB" smtClean="0"/>
-              <a:t>‹#›</a:t>
+              <a:t>‹N›</a:t>
             </a:fld>
             <a:endParaRPr lang="en-GB" dirty="0"/>
           </a:p>
@@ -2649,7 +2649,7 @@
           <a:p>
             <a:fld id="{2D2B23BE-89C9-4E17-8330-1D0EE89529DF}" type="slidenum">
               <a:rPr lang="en-GB" smtClean="0"/>
-              <a:t>‹#›</a:t>
+              <a:t>‹N›</a:t>
             </a:fld>
             <a:endParaRPr lang="en-GB" dirty="0"/>
           </a:p>
@@ -2905,7 +2905,7 @@
           <a:p>
             <a:fld id="{2D2B23BE-89C9-4E17-8330-1D0EE89529DF}" type="slidenum">
               <a:rPr lang="en-GB" smtClean="0"/>
-              <a:t>‹#›</a:t>
+              <a:t>‹N›</a:t>
             </a:fld>
             <a:endParaRPr lang="en-GB" dirty="0"/>
           </a:p>
@@ -3154,7 +3154,7 @@
           <a:p>
             <a:fld id="{2D2B23BE-89C9-4E17-8330-1D0EE89529DF}" type="slidenum">
               <a:rPr lang="en-GB" smtClean="0"/>
-              <a:t>‹#›</a:t>
+              <a:t>‹N›</a:t>
             </a:fld>
             <a:endParaRPr lang="en-GB" dirty="0"/>
           </a:p>
@@ -4281,7 +4281,7 @@
         </p:nvSpPr>
         <p:spPr>
           <a:xfrm>
-            <a:off x="5215081" y="4874262"/>
+            <a:off x="3695147" y="2843855"/>
             <a:ext cx="513282" cy="369332"/>
           </a:xfrm>
           <a:prstGeom prst="rect">
@@ -4310,13 +4310,17 @@
         </p:nvSpPr>
         <p:spPr>
           <a:xfrm>
-            <a:off x="4498990" y="4543972"/>
+            <a:off x="2659690" y="2914044"/>
             <a:ext cx="595204" cy="514956"/>
           </a:xfrm>
           <a:prstGeom prst="diamond">
             <a:avLst/>
           </a:prstGeom>
-          <a:ln w="38100"/>
+          <a:ln w="38100">
+            <a:solidFill>
+              <a:srgbClr val="FF0000"/>
+            </a:solidFill>
+          </a:ln>
         </p:spPr>
         <p:style>
           <a:lnRef idx="2">
@@ -4353,7 +4357,7 @@
         </p:nvSpPr>
         <p:spPr>
           <a:xfrm>
-            <a:off x="3984835" y="4855164"/>
+            <a:off x="2978090" y="4118963"/>
             <a:ext cx="481222" cy="369332"/>
           </a:xfrm>
           <a:prstGeom prst="rect">
@@ -4382,7 +4386,7 @@
         </p:nvSpPr>
         <p:spPr>
           <a:xfrm>
-            <a:off x="3767901" y="1622072"/>
+            <a:off x="3785578" y="1791929"/>
             <a:ext cx="576701" cy="738664"/>
           </a:xfrm>
           <a:prstGeom prst="rect">
@@ -4463,7 +4467,7 @@
         </p:nvSpPr>
         <p:spPr>
           <a:xfrm>
-            <a:off x="4187493" y="2862065"/>
+            <a:off x="4165926" y="2886435"/>
             <a:ext cx="1290009" cy="587141"/>
           </a:xfrm>
           <a:prstGeom prst="rect">
@@ -4508,8 +4512,8 @@
         </p:nvCxnSpPr>
         <p:spPr>
           <a:xfrm rot="16200000" flipH="1">
-            <a:off x="1823150" y="4454313"/>
-            <a:ext cx="350919" cy="322124"/>
+            <a:off x="1825332" y="4456495"/>
+            <a:ext cx="283471" cy="385207"/>
           </a:xfrm>
           <a:prstGeom prst="bentConnector2">
             <a:avLst/>
@@ -4538,13 +4542,17 @@
         </p:nvSpPr>
         <p:spPr>
           <a:xfrm>
-            <a:off x="1539945" y="3924960"/>
+            <a:off x="1476862" y="3992408"/>
             <a:ext cx="595204" cy="514956"/>
           </a:xfrm>
           <a:prstGeom prst="diamond">
             <a:avLst/>
           </a:prstGeom>
-          <a:ln w="38100"/>
+          <a:ln w="38100">
+            <a:solidFill>
+              <a:srgbClr val="FF0000"/>
+            </a:solidFill>
+          </a:ln>
         </p:spPr>
         <p:style>
           <a:lnRef idx="2">
@@ -4578,16 +4586,20 @@
           <p:cNvPr id="38" name="Elbow Connector 37"/>
           <p:cNvCxnSpPr>
             <a:cxnSpLocks/>
+            <a:stCxn id="35" idx="0"/>
+            <a:endCxn id="42" idx="2"/>
           </p:cNvCxnSpPr>
           <p:nvPr/>
         </p:nvCxnSpPr>
         <p:spPr>
-          <a:xfrm rot="16200000" flipV="1">
-            <a:off x="1586787" y="3682137"/>
-            <a:ext cx="513126" cy="11606"/>
+          <a:xfrm rot="5400000" flipH="1" flipV="1">
+            <a:off x="1503066" y="3720606"/>
+            <a:ext cx="543201" cy="405"/>
           </a:xfrm>
           <a:prstGeom prst="bentConnector3">
-            <a:avLst/>
+            <a:avLst>
+              <a:gd name="adj1" fmla="val 50000"/>
+            </a:avLst>
           </a:prstGeom>
         </p:spPr>
         <p:style>
@@ -4613,7 +4625,7 @@
         </p:nvSpPr>
         <p:spPr>
           <a:xfrm>
-            <a:off x="4715280" y="1916284"/>
+            <a:off x="5499008" y="3208570"/>
             <a:ext cx="683751" cy="1169551"/>
           </a:xfrm>
           <a:prstGeom prst="rect">
@@ -4662,7 +4674,7 @@
         </p:nvSpPr>
         <p:spPr>
           <a:xfrm>
-            <a:off x="1937620" y="3573508"/>
+            <a:off x="1786415" y="3449295"/>
             <a:ext cx="513282" cy="369332"/>
           </a:xfrm>
           <a:prstGeom prst="rect">
@@ -4720,7 +4732,7 @@
         </p:nvSpPr>
         <p:spPr>
           <a:xfrm>
-            <a:off x="1280160" y="2862066"/>
+            <a:off x="1205875" y="2862066"/>
             <a:ext cx="1137987" cy="587141"/>
           </a:xfrm>
           <a:prstGeom prst="rect">
@@ -4762,7 +4774,7 @@
         </p:nvSpPr>
         <p:spPr>
           <a:xfrm>
-            <a:off x="412425" y="2036134"/>
+            <a:off x="271645" y="2797050"/>
             <a:ext cx="1003955" cy="1169551"/>
           </a:xfrm>
           <a:prstGeom prst="rect">
@@ -4821,7 +4833,7 @@
         </p:nvSpPr>
         <p:spPr>
           <a:xfrm>
-            <a:off x="6429057" y="1697221"/>
+            <a:off x="6345866" y="1091121"/>
             <a:ext cx="1137987" cy="587141"/>
           </a:xfrm>
           <a:prstGeom prst="rect">
@@ -4869,7 +4881,7 @@
         </p:nvSpPr>
         <p:spPr>
           <a:xfrm>
-            <a:off x="7567044" y="1507877"/>
+            <a:off x="7548051" y="1077367"/>
             <a:ext cx="1003955" cy="738664"/>
           </a:xfrm>
           <a:prstGeom prst="rect">
@@ -4916,7 +4928,7 @@
         </p:nvSpPr>
         <p:spPr>
           <a:xfrm>
-            <a:off x="6385299" y="5607626"/>
+            <a:off x="6345866" y="1939097"/>
             <a:ext cx="1137987" cy="587141"/>
           </a:xfrm>
           <a:prstGeom prst="rect">
@@ -4944,10 +4956,9 @@
           <a:p>
             <a:pPr algn="ctr"/>
             <a:r>
-              <a:rPr lang="en-GB" dirty="0" err="1"/>
+              <a:rPr lang="en-GB" dirty="0"/>
               <a:t>OffensiveWord</a:t>
             </a:r>
-            <a:endParaRPr lang="en-GB" dirty="0"/>
           </a:p>
         </p:txBody>
       </p:sp>
@@ -4965,8 +4976,8 @@
         </p:nvSpPr>
         <p:spPr>
           <a:xfrm>
-            <a:off x="5786666" y="5665610"/>
-            <a:ext cx="598241" cy="307777"/>
+            <a:off x="7547476" y="1991209"/>
+            <a:ext cx="560474" cy="307777"/>
           </a:xfrm>
           <a:prstGeom prst="rect">
             <a:avLst/>
@@ -4981,7 +4992,7 @@
           <a:p>
             <a:r>
               <a:rPr lang="en-GB" sz="1400" u="sng" dirty="0"/>
-              <a:t>name</a:t>
+              <a:t>word</a:t>
             </a:r>
           </a:p>
         </p:txBody>
@@ -5092,7 +5103,11 @@
           <a:prstGeom prst="diamond">
             <a:avLst/>
           </a:prstGeom>
-          <a:ln w="38100"/>
+          <a:ln w="38100">
+            <a:solidFill>
+              <a:srgbClr val="FF0000"/>
+            </a:solidFill>
+          </a:ln>
         </p:spPr>
         <p:style>
           <a:lnRef idx="2">
@@ -5179,7 +5194,7 @@
         </p:nvSpPr>
         <p:spPr>
           <a:xfrm>
-            <a:off x="7548051" y="4255945"/>
+            <a:off x="7490790" y="4507363"/>
             <a:ext cx="1003955" cy="738664"/>
           </a:xfrm>
           <a:prstGeom prst="rect">
@@ -5226,8 +5241,8 @@
         </p:nvSpPr>
         <p:spPr>
           <a:xfrm>
-            <a:off x="6701952" y="4124176"/>
-            <a:ext cx="481222" cy="369332"/>
+            <a:off x="6627260" y="5109814"/>
+            <a:ext cx="513282" cy="369332"/>
           </a:xfrm>
           <a:prstGeom prst="rect">
             <a:avLst/>
@@ -5242,7 +5257,7 @@
           <a:p>
             <a:r>
               <a:rPr lang="en-GB" dirty="0"/>
-              <a:t>1:1</a:t>
+              <a:t>0:N</a:t>
             </a:r>
           </a:p>
         </p:txBody>
@@ -5261,7 +5276,7 @@
         </p:nvSpPr>
         <p:spPr>
           <a:xfrm>
-            <a:off x="5907903" y="3225009"/>
+            <a:off x="5490307" y="2843855"/>
             <a:ext cx="513282" cy="369332"/>
           </a:xfrm>
           <a:prstGeom prst="rect">
@@ -5296,13 +5311,17 @@
         </p:nvSpPr>
         <p:spPr>
           <a:xfrm>
-            <a:off x="2875599" y="2892202"/>
+            <a:off x="1478862" y="1929167"/>
             <a:ext cx="595204" cy="514956"/>
           </a:xfrm>
           <a:prstGeom prst="diamond">
             <a:avLst/>
           </a:prstGeom>
-          <a:ln w="38100"/>
+          <a:ln w="38100">
+            <a:solidFill>
+              <a:srgbClr val="FF0000"/>
+            </a:solidFill>
+          </a:ln>
         </p:spPr>
         <p:style>
           <a:lnRef idx="2">
@@ -5345,7 +5364,7 @@
         </p:nvSpPr>
         <p:spPr>
           <a:xfrm>
-            <a:off x="2603843" y="1877209"/>
+            <a:off x="2601853" y="1896068"/>
             <a:ext cx="1137987" cy="587141"/>
           </a:xfrm>
           <a:prstGeom prst="rect">
@@ -5393,7 +5412,7 @@
         </p:nvSpPr>
         <p:spPr>
           <a:xfrm>
-            <a:off x="4816586" y="5573145"/>
+            <a:off x="4878974" y="5798867"/>
             <a:ext cx="742328" cy="523220"/>
           </a:xfrm>
           <a:prstGeom prst="rect">
@@ -5435,7 +5454,7 @@
         </p:nvSpPr>
         <p:spPr>
           <a:xfrm>
-            <a:off x="3201767" y="2517149"/>
+            <a:off x="2062896" y="1885494"/>
             <a:ext cx="481222" cy="369332"/>
           </a:xfrm>
           <a:prstGeom prst="rect">
@@ -5470,7 +5489,7 @@
         </p:nvSpPr>
         <p:spPr>
           <a:xfrm>
-            <a:off x="2427069" y="3225009"/>
+            <a:off x="1754432" y="2488901"/>
             <a:ext cx="513282" cy="369332"/>
           </a:xfrm>
           <a:prstGeom prst="rect">
@@ -5502,13 +5521,15 @@
           </p:cNvPr>
           <p:cNvCxnSpPr>
             <a:cxnSpLocks/>
+            <a:stCxn id="101" idx="2"/>
+            <a:endCxn id="42" idx="0"/>
           </p:cNvCxnSpPr>
           <p:nvPr/>
         </p:nvCxnSpPr>
         <p:spPr>
-          <a:xfrm>
-            <a:off x="2418147" y="3150925"/>
-            <a:ext cx="463334" cy="0"/>
+          <a:xfrm flipH="1">
+            <a:off x="1774869" y="2444123"/>
+            <a:ext cx="1595" cy="417943"/>
           </a:xfrm>
           <a:prstGeom prst="straightConnector1">
             <a:avLst/>
@@ -5544,14 +5565,15 @@
           </p:cNvPr>
           <p:cNvCxnSpPr>
             <a:cxnSpLocks/>
-            <a:endCxn id="101" idx="0"/>
+            <a:stCxn id="103" idx="1"/>
+            <a:endCxn id="101" idx="3"/>
           </p:cNvCxnSpPr>
           <p:nvPr/>
         </p:nvCxnSpPr>
         <p:spPr>
-          <a:xfrm>
-            <a:off x="3173201" y="2468943"/>
-            <a:ext cx="0" cy="423259"/>
+          <a:xfrm flipH="1" flipV="1">
+            <a:off x="2074066" y="2186645"/>
+            <a:ext cx="527787" cy="2994"/>
           </a:xfrm>
           <a:prstGeom prst="straightConnector1">
             <a:avLst/>
@@ -5587,15 +5609,15 @@
           </p:cNvPr>
           <p:cNvCxnSpPr>
             <a:cxnSpLocks/>
-            <a:stCxn id="17" idx="3"/>
-            <a:endCxn id="16" idx="1"/>
+            <a:stCxn id="17" idx="0"/>
+            <a:endCxn id="16" idx="2"/>
           </p:cNvCxnSpPr>
           <p:nvPr/>
         </p:nvCxnSpPr>
         <p:spPr>
-          <a:xfrm>
-            <a:off x="3767090" y="4790835"/>
-            <a:ext cx="731900" cy="10615"/>
+          <a:xfrm flipH="1" flipV="1">
+            <a:off x="2957292" y="3429000"/>
+            <a:ext cx="6089" cy="1068264"/>
           </a:xfrm>
           <a:prstGeom prst="straightConnector1">
             <a:avLst/>
@@ -5632,14 +5654,14 @@
           <p:cNvCxnSpPr>
             <a:cxnSpLocks/>
             <a:stCxn id="16" idx="3"/>
-            <a:endCxn id="65" idx="1"/>
+            <a:endCxn id="18" idx="1"/>
           </p:cNvCxnSpPr>
           <p:nvPr/>
         </p:nvCxnSpPr>
         <p:spPr>
           <a:xfrm>
-            <a:off x="5094194" y="4801450"/>
-            <a:ext cx="760576" cy="21721"/>
+            <a:off x="3254894" y="3171522"/>
+            <a:ext cx="911032" cy="8484"/>
           </a:xfrm>
           <a:prstGeom prst="straightConnector1">
             <a:avLst/>
@@ -5720,13 +5742,17 @@
         </p:nvSpPr>
         <p:spPr>
           <a:xfrm>
-            <a:off x="2652880" y="5489164"/>
+            <a:off x="2680488" y="5479146"/>
             <a:ext cx="595204" cy="514956"/>
           </a:xfrm>
           <a:prstGeom prst="diamond">
             <a:avLst/>
           </a:prstGeom>
-          <a:ln w="38100"/>
+          <a:ln w="38100">
+            <a:solidFill>
+              <a:srgbClr val="FF0000"/>
+            </a:solidFill>
+          </a:ln>
         </p:spPr>
         <p:style>
           <a:lnRef idx="2">
@@ -5766,13 +5792,15 @@
           </p:cNvPr>
           <p:cNvCxnSpPr>
             <a:cxnSpLocks/>
+            <a:stCxn id="126" idx="3"/>
+            <a:endCxn id="131" idx="1"/>
           </p:cNvCxnSpPr>
           <p:nvPr/>
         </p:nvCxnSpPr>
         <p:spPr>
           <a:xfrm>
-            <a:off x="3248084" y="5746642"/>
-            <a:ext cx="493746" cy="264455"/>
+            <a:off x="3275692" y="5736624"/>
+            <a:ext cx="478499" cy="1"/>
           </a:xfrm>
           <a:prstGeom prst="bentConnector3">
             <a:avLst>
@@ -5809,7 +5837,7 @@
         </p:nvSpPr>
         <p:spPr>
           <a:xfrm>
-            <a:off x="3701508" y="5717526"/>
+            <a:off x="3754191" y="5443054"/>
             <a:ext cx="1137987" cy="587141"/>
           </a:xfrm>
           <a:prstGeom prst="rect">
@@ -5857,7 +5885,7 @@
         </p:nvSpPr>
         <p:spPr>
           <a:xfrm>
-            <a:off x="3075083" y="5935335"/>
+            <a:off x="3261369" y="5707470"/>
             <a:ext cx="481222" cy="369332"/>
           </a:xfrm>
           <a:prstGeom prst="rect">
@@ -5927,8 +5955,8 @@
         </p:nvSpPr>
         <p:spPr>
           <a:xfrm>
-            <a:off x="2950482" y="4154534"/>
-            <a:ext cx="1003955" cy="307777"/>
+            <a:off x="3761001" y="4493998"/>
+            <a:ext cx="999535" cy="523220"/>
           </a:xfrm>
           <a:prstGeom prst="rect">
             <a:avLst/>
@@ -5944,6 +5972,455 @@
             <a:r>
               <a:rPr lang="en-GB" sz="1400" u="sng" dirty="0"/>
               <a:t>id</a:t>
+            </a:r>
+          </a:p>
+          <a:p>
+            <a:r>
+              <a:rPr lang="en-GB" sz="1400" dirty="0"/>
+              <a:t>canceled*</a:t>
+            </a:r>
+          </a:p>
+        </p:txBody>
+      </p:sp>
+      <p:sp>
+        <p:nvSpPr>
+          <p:cNvPr id="96" name="Diamond 125">
+            <a:extLst>
+              <a:ext uri="{FF2B5EF4-FFF2-40B4-BE49-F238E27FC236}">
+                <a16:creationId xmlns:a16="http://schemas.microsoft.com/office/drawing/2014/main" id="{7AD7D8C6-22CF-4027-AB9B-37668C749C23}"/>
+              </a:ext>
+            </a:extLst>
+          </p:cNvPr>
+          <p:cNvSpPr/>
+          <p:nvPr/>
+        </p:nvSpPr>
+        <p:spPr>
+          <a:xfrm>
+            <a:off x="6369286" y="5479146"/>
+            <a:ext cx="595204" cy="514956"/>
+          </a:xfrm>
+          <a:prstGeom prst="diamond">
+            <a:avLst/>
+          </a:prstGeom>
+          <a:ln w="38100">
+            <a:solidFill>
+              <a:srgbClr val="FF0000"/>
+            </a:solidFill>
+          </a:ln>
+        </p:spPr>
+        <p:style>
+          <a:lnRef idx="2">
+            <a:schemeClr val="accent1"/>
+          </a:lnRef>
+          <a:fillRef idx="1">
+            <a:schemeClr val="lt1"/>
+          </a:fillRef>
+          <a:effectRef idx="0">
+            <a:schemeClr val="accent1"/>
+          </a:effectRef>
+          <a:fontRef idx="minor">
+            <a:schemeClr val="dk1"/>
+          </a:fontRef>
+        </p:style>
+        <p:txBody>
+          <a:bodyPr rtlCol="0" anchor="ctr"/>
+          <a:lstStyle/>
+          <a:p>
+            <a:pPr algn="ctr"/>
+            <a:endParaRPr lang="en-GB" dirty="0">
+              <a:solidFill>
+                <a:schemeClr val="dk1"/>
+              </a:solidFill>
+            </a:endParaRPr>
+          </a:p>
+        </p:txBody>
+      </p:sp>
+      <p:cxnSp>
+        <p:nvCxnSpPr>
+          <p:cNvPr id="102" name="Elbow Connector 32">
+            <a:extLst>
+              <a:ext uri="{FF2B5EF4-FFF2-40B4-BE49-F238E27FC236}">
+                <a16:creationId xmlns:a16="http://schemas.microsoft.com/office/drawing/2014/main" id="{B86C9FA1-E8AE-49B9-8356-8FFD08BF9EE2}"/>
+              </a:ext>
+            </a:extLst>
+          </p:cNvPr>
+          <p:cNvCxnSpPr>
+            <a:cxnSpLocks/>
+            <a:stCxn id="131" idx="3"/>
+            <a:endCxn id="96" idx="1"/>
+          </p:cNvCxnSpPr>
+          <p:nvPr/>
+        </p:nvCxnSpPr>
+        <p:spPr>
+          <a:xfrm flipV="1">
+            <a:off x="4892178" y="5736624"/>
+            <a:ext cx="1477108" cy="1"/>
+          </a:xfrm>
+          <a:prstGeom prst="bentConnector3">
+            <a:avLst>
+              <a:gd name="adj1" fmla="val 50000"/>
+            </a:avLst>
+          </a:prstGeom>
+        </p:spPr>
+        <p:style>
+          <a:lnRef idx="1">
+            <a:schemeClr val="accent1"/>
+          </a:lnRef>
+          <a:fillRef idx="0">
+            <a:schemeClr val="accent1"/>
+          </a:fillRef>
+          <a:effectRef idx="0">
+            <a:schemeClr val="accent1"/>
+          </a:effectRef>
+          <a:fontRef idx="minor">
+            <a:schemeClr val="tx1"/>
+          </a:fontRef>
+        </p:style>
+      </p:cxnSp>
+      <p:cxnSp>
+        <p:nvCxnSpPr>
+          <p:cNvPr id="116" name="Straight Arrow Connector 68">
+            <a:extLst>
+              <a:ext uri="{FF2B5EF4-FFF2-40B4-BE49-F238E27FC236}">
+                <a16:creationId xmlns:a16="http://schemas.microsoft.com/office/drawing/2014/main" id="{F12B986E-A99F-49DC-9C80-93407A107C65}"/>
+              </a:ext>
+            </a:extLst>
+          </p:cNvPr>
+          <p:cNvCxnSpPr>
+            <a:cxnSpLocks/>
+            <a:stCxn id="96" idx="0"/>
+            <a:endCxn id="65" idx="2"/>
+          </p:cNvCxnSpPr>
+          <p:nvPr/>
+        </p:nvCxnSpPr>
+        <p:spPr>
+          <a:xfrm flipH="1" flipV="1">
+            <a:off x="6658480" y="5116741"/>
+            <a:ext cx="8408" cy="362405"/>
+          </a:xfrm>
+          <a:prstGeom prst="straightConnector1">
+            <a:avLst/>
+          </a:prstGeom>
+          <a:ln>
+            <a:headEnd type="none" w="med" len="med"/>
+            <a:tailEnd type="none" w="med" len="med"/>
+          </a:ln>
+        </p:spPr>
+        <p:style>
+          <a:lnRef idx="1">
+            <a:schemeClr val="accent1"/>
+          </a:lnRef>
+          <a:fillRef idx="0">
+            <a:schemeClr val="accent1"/>
+          </a:fillRef>
+          <a:effectRef idx="0">
+            <a:schemeClr val="accent1"/>
+          </a:effectRef>
+          <a:fontRef idx="minor">
+            <a:schemeClr val="tx1"/>
+          </a:fontRef>
+        </p:style>
+      </p:cxnSp>
+      <p:sp>
+        <p:nvSpPr>
+          <p:cNvPr id="137" name="TextBox 77">
+            <a:extLst>
+              <a:ext uri="{FF2B5EF4-FFF2-40B4-BE49-F238E27FC236}">
+                <a16:creationId xmlns:a16="http://schemas.microsoft.com/office/drawing/2014/main" id="{C22DABB1-990E-40F5-A8F0-DED7DF7125BE}"/>
+              </a:ext>
+            </a:extLst>
+          </p:cNvPr>
+          <p:cNvSpPr txBox="1"/>
+          <p:nvPr/>
+        </p:nvSpPr>
+        <p:spPr>
+          <a:xfrm>
+            <a:off x="4926441" y="5433667"/>
+            <a:ext cx="481222" cy="369332"/>
+          </a:xfrm>
+          <a:prstGeom prst="rect">
+            <a:avLst/>
+          </a:prstGeom>
+          <a:noFill/>
+        </p:spPr>
+        <p:txBody>
+          <a:bodyPr wrap="none" rtlCol="0">
+            <a:spAutoFit/>
+          </a:bodyPr>
+          <a:lstStyle/>
+          <a:p>
+            <a:r>
+              <a:rPr lang="en-GB" dirty="0"/>
+              <a:t>1:1</a:t>
+            </a:r>
+          </a:p>
+        </p:txBody>
+      </p:sp>
+      <p:sp>
+        <p:nvSpPr>
+          <p:cNvPr id="138" name="TextBox 77">
+            <a:extLst>
+              <a:ext uri="{FF2B5EF4-FFF2-40B4-BE49-F238E27FC236}">
+                <a16:creationId xmlns:a16="http://schemas.microsoft.com/office/drawing/2014/main" id="{45B58DD4-CDB3-4421-85C9-2EDF354B1B66}"/>
+              </a:ext>
+            </a:extLst>
+          </p:cNvPr>
+          <p:cNvSpPr txBox="1"/>
+          <p:nvPr/>
+        </p:nvSpPr>
+        <p:spPr>
+          <a:xfrm>
+            <a:off x="6715471" y="4117955"/>
+            <a:ext cx="481222" cy="369332"/>
+          </a:xfrm>
+          <a:prstGeom prst="rect">
+            <a:avLst/>
+          </a:prstGeom>
+          <a:noFill/>
+        </p:spPr>
+        <p:txBody>
+          <a:bodyPr wrap="none" rtlCol="0">
+            <a:spAutoFit/>
+          </a:bodyPr>
+          <a:lstStyle/>
+          <a:p>
+            <a:r>
+              <a:rPr lang="en-GB" dirty="0"/>
+              <a:t>1:1</a:t>
+            </a:r>
+          </a:p>
+        </p:txBody>
+      </p:sp>
+      <p:sp>
+        <p:nvSpPr>
+          <p:cNvPr id="139" name="TextBox 23">
+            <a:extLst>
+              <a:ext uri="{FF2B5EF4-FFF2-40B4-BE49-F238E27FC236}">
+                <a16:creationId xmlns:a16="http://schemas.microsoft.com/office/drawing/2014/main" id="{B42ED671-09F8-447F-B73B-DAF6F373B206}"/>
+              </a:ext>
+            </a:extLst>
+          </p:cNvPr>
+          <p:cNvSpPr txBox="1"/>
+          <p:nvPr/>
+        </p:nvSpPr>
+        <p:spPr>
+          <a:xfrm>
+            <a:off x="887318" y="2147104"/>
+            <a:ext cx="940192" cy="307777"/>
+          </a:xfrm>
+          <a:prstGeom prst="rect">
+            <a:avLst/>
+          </a:prstGeom>
+          <a:noFill/>
+        </p:spPr>
+        <p:txBody>
+          <a:bodyPr wrap="square" rtlCol="0">
+            <a:spAutoFit/>
+          </a:bodyPr>
+          <a:lstStyle/>
+          <a:p>
+            <a:r>
+              <a:rPr lang="en-GB" sz="1400" dirty="0">
+                <a:solidFill>
+                  <a:srgbClr val="FF0000"/>
+                </a:solidFill>
+              </a:rPr>
+              <a:t>logging</a:t>
+            </a:r>
+          </a:p>
+        </p:txBody>
+      </p:sp>
+      <p:sp>
+        <p:nvSpPr>
+          <p:cNvPr id="140" name="TextBox 23">
+            <a:extLst>
+              <a:ext uri="{FF2B5EF4-FFF2-40B4-BE49-F238E27FC236}">
+                <a16:creationId xmlns:a16="http://schemas.microsoft.com/office/drawing/2014/main" id="{91A79E42-FBA0-454A-9D03-930EB74DBB01}"/>
+              </a:ext>
+            </a:extLst>
+          </p:cNvPr>
+          <p:cNvSpPr txBox="1"/>
+          <p:nvPr/>
+        </p:nvSpPr>
+        <p:spPr>
+          <a:xfrm>
+            <a:off x="887318" y="4266064"/>
+            <a:ext cx="796632" cy="307777"/>
+          </a:xfrm>
+          <a:prstGeom prst="rect">
+            <a:avLst/>
+          </a:prstGeom>
+          <a:noFill/>
+        </p:spPr>
+        <p:txBody>
+          <a:bodyPr wrap="square" rtlCol="0">
+            <a:spAutoFit/>
+          </a:bodyPr>
+          <a:lstStyle/>
+          <a:p>
+            <a:r>
+              <a:rPr lang="en-GB" sz="1400" dirty="0">
+                <a:solidFill>
+                  <a:srgbClr val="FF0000"/>
+                </a:solidFill>
+              </a:rPr>
+              <a:t>sending</a:t>
+            </a:r>
+          </a:p>
+        </p:txBody>
+      </p:sp>
+      <p:sp>
+        <p:nvSpPr>
+          <p:cNvPr id="141" name="TextBox 23">
+            <a:extLst>
+              <a:ext uri="{FF2B5EF4-FFF2-40B4-BE49-F238E27FC236}">
+                <a16:creationId xmlns:a16="http://schemas.microsoft.com/office/drawing/2014/main" id="{BB19FF49-D625-4E1C-9770-882D29DF4C0A}"/>
+              </a:ext>
+            </a:extLst>
+          </p:cNvPr>
+          <p:cNvSpPr txBox="1"/>
+          <p:nvPr/>
+        </p:nvSpPr>
+        <p:spPr>
+          <a:xfrm>
+            <a:off x="2038192" y="5772232"/>
+            <a:ext cx="845837" cy="307777"/>
+          </a:xfrm>
+          <a:prstGeom prst="rect">
+            <a:avLst/>
+          </a:prstGeom>
+          <a:noFill/>
+        </p:spPr>
+        <p:txBody>
+          <a:bodyPr wrap="square" rtlCol="0">
+            <a:spAutoFit/>
+          </a:bodyPr>
+          <a:lstStyle/>
+          <a:p>
+            <a:r>
+              <a:rPr lang="en-GB" sz="1400" dirty="0">
+                <a:solidFill>
+                  <a:srgbClr val="FF0000"/>
+                </a:solidFill>
+              </a:rPr>
+              <a:t>including</a:t>
+            </a:r>
+          </a:p>
+        </p:txBody>
+      </p:sp>
+      <p:sp>
+        <p:nvSpPr>
+          <p:cNvPr id="142" name="TextBox 23">
+            <a:extLst>
+              <a:ext uri="{FF2B5EF4-FFF2-40B4-BE49-F238E27FC236}">
+                <a16:creationId xmlns:a16="http://schemas.microsoft.com/office/drawing/2014/main" id="{2C00AB0C-EA75-4914-927D-AAAC1BF7AD45}"/>
+              </a:ext>
+            </a:extLst>
+          </p:cNvPr>
+          <p:cNvSpPr txBox="1"/>
+          <p:nvPr/>
+        </p:nvSpPr>
+        <p:spPr>
+          <a:xfrm>
+            <a:off x="3059201" y="3238623"/>
+            <a:ext cx="845837" cy="307777"/>
+          </a:xfrm>
+          <a:prstGeom prst="rect">
+            <a:avLst/>
+          </a:prstGeom>
+          <a:noFill/>
+        </p:spPr>
+        <p:txBody>
+          <a:bodyPr wrap="square" rtlCol="0">
+            <a:spAutoFit/>
+          </a:bodyPr>
+          <a:lstStyle/>
+          <a:p>
+            <a:r>
+              <a:rPr lang="en-GB" sz="1400" dirty="0">
+                <a:solidFill>
+                  <a:srgbClr val="FF0000"/>
+                </a:solidFill>
+              </a:rPr>
+              <a:t>referring</a:t>
+            </a:r>
+          </a:p>
+        </p:txBody>
+      </p:sp>
+      <p:sp>
+        <p:nvSpPr>
+          <p:cNvPr id="144" name="TextBox 23">
+            <a:extLst>
+              <a:ext uri="{FF2B5EF4-FFF2-40B4-BE49-F238E27FC236}">
+                <a16:creationId xmlns:a16="http://schemas.microsoft.com/office/drawing/2014/main" id="{CD07077A-173B-45A8-9395-693547C0F547}"/>
+              </a:ext>
+            </a:extLst>
+          </p:cNvPr>
+          <p:cNvSpPr txBox="1"/>
+          <p:nvPr/>
+        </p:nvSpPr>
+        <p:spPr>
+          <a:xfrm>
+            <a:off x="6868600" y="5766879"/>
+            <a:ext cx="1057513" cy="307777"/>
+          </a:xfrm>
+          <a:prstGeom prst="rect">
+            <a:avLst/>
+          </a:prstGeom>
+          <a:noFill/>
+        </p:spPr>
+        <p:txBody>
+          <a:bodyPr wrap="square" rtlCol="0">
+            <a:spAutoFit/>
+          </a:bodyPr>
+          <a:lstStyle/>
+          <a:p>
+            <a:r>
+              <a:rPr lang="en-GB" sz="1400" dirty="0">
+                <a:solidFill>
+                  <a:srgbClr val="FF0000"/>
+                </a:solidFill>
+              </a:rPr>
+              <a:t>replying</a:t>
+            </a:r>
+          </a:p>
+        </p:txBody>
+      </p:sp>
+      <p:sp>
+        <p:nvSpPr>
+          <p:cNvPr id="145" name="TextBox 23">
+            <a:extLst>
+              <a:ext uri="{FF2B5EF4-FFF2-40B4-BE49-F238E27FC236}">
+                <a16:creationId xmlns:a16="http://schemas.microsoft.com/office/drawing/2014/main" id="{0AD33BDF-B53A-49EF-9949-981A7DF00ED7}"/>
+              </a:ext>
+            </a:extLst>
+          </p:cNvPr>
+          <p:cNvSpPr txBox="1"/>
+          <p:nvPr/>
+        </p:nvSpPr>
+        <p:spPr>
+          <a:xfrm>
+            <a:off x="6779629" y="3549752"/>
+            <a:ext cx="1057513" cy="307777"/>
+          </a:xfrm>
+          <a:prstGeom prst="rect">
+            <a:avLst/>
+          </a:prstGeom>
+          <a:noFill/>
+        </p:spPr>
+        <p:txBody>
+          <a:bodyPr wrap="square" rtlCol="0">
+            <a:spAutoFit/>
+          </a:bodyPr>
+          <a:lstStyle/>
+          <a:p>
+            <a:r>
+              <a:rPr lang="en-GB" sz="1400" dirty="0">
+                <a:solidFill>
+                  <a:srgbClr val="FF0000"/>
+                </a:solidFill>
+              </a:rPr>
+              <a:t>having</a:t>
             </a:r>
           </a:p>
         </p:txBody>
@@ -6012,8 +6489,8 @@
         </p:nvSpPr>
         <p:spPr>
           <a:xfrm>
-            <a:off x="628647" y="1630624"/>
-            <a:ext cx="8399847" cy="4862250"/>
+            <a:off x="509047" y="1630624"/>
+            <a:ext cx="8519447" cy="4862250"/>
           </a:xfrm>
         </p:spPr>
         <p:txBody>
@@ -6035,7 +6512,7 @@
             </a:r>
             <a:r>
               <a:rPr lang="en-GB" sz="2000" dirty="0"/>
-              <a:t>, user ,date)		</a:t>
+              <a:t>, user, datetime)		</a:t>
             </a:r>
           </a:p>
           <a:p>
@@ -6081,7 +6558,7 @@
             </a:r>
             <a:r>
               <a:rPr lang="en-GB" sz="2000" dirty="0"/>
-              <a:t>, user, question)</a:t>
+              <a:t>, user, product, canceled*)</a:t>
             </a:r>
           </a:p>
           <a:p>
@@ -6104,7 +6581,7 @@
             </a:r>
             <a:r>
               <a:rPr lang="en-GB" sz="2000" dirty="0"/>
-              <a:t>, submission, text)	Question(</a:t>
+              <a:t>, submission, question, text)	Product(</a:t>
             </a:r>
             <a:r>
               <a:rPr lang="en-GB" sz="2000" u="sng" dirty="0"/>
@@ -6112,7 +6589,7 @@
             </a:r>
             <a:r>
               <a:rPr lang="en-GB" sz="2000" dirty="0"/>
-              <a:t>, product, text, mandatory)</a:t>
+              <a:t>, name, image, date)</a:t>
             </a:r>
           </a:p>
           <a:p>
@@ -6127,7 +6604,7 @@
             </a:pPr>
             <a:r>
               <a:rPr lang="en-GB" sz="2000" dirty="0"/>
-              <a:t>		Product(</a:t>
+              <a:t>		Question(</a:t>
             </a:r>
             <a:r>
               <a:rPr lang="en-GB" sz="2000" u="sng" dirty="0"/>
@@ -6135,14 +6612,17 @@
             </a:r>
             <a:r>
               <a:rPr lang="en-GB" sz="2000" dirty="0"/>
-              <a:t>, name, image, date)</a:t>
+              <a:t>, product, text, mandatory)</a:t>
             </a:r>
           </a:p>
           <a:p>
             <a:pPr marL="0" indent="0">
               <a:buNone/>
             </a:pPr>
-            <a:endParaRPr lang="en-GB" sz="2000" dirty="0"/>
+            <a:r>
+              <a:rPr lang="en-GB" sz="2000" dirty="0"/>
+              <a:t>		</a:t>
+            </a:r>
           </a:p>
           <a:p>
             <a:pPr marL="0" indent="0">
@@ -6241,8 +6721,8 @@
         </p:nvCxnSpPr>
         <p:spPr>
           <a:xfrm flipH="1">
-            <a:off x="1413933" y="1896533"/>
-            <a:ext cx="262468" cy="499534"/>
+            <a:off x="1338606" y="1913641"/>
+            <a:ext cx="245097" cy="491951"/>
           </a:xfrm>
           <a:prstGeom prst="straightConnector1">
             <a:avLst/>
@@ -6276,49 +6756,8 @@
         </p:nvCxnSpPr>
         <p:spPr>
           <a:xfrm flipH="1" flipV="1">
-            <a:off x="1413935" y="2675467"/>
-            <a:ext cx="880532" cy="435503"/>
-          </a:xfrm>
-          <a:prstGeom prst="straightConnector1">
-            <a:avLst/>
-          </a:prstGeom>
-          <a:ln w="38100">
-            <a:tailEnd type="triangle"/>
-          </a:ln>
-        </p:spPr>
-        <p:style>
-          <a:lnRef idx="1">
-            <a:schemeClr val="accent1"/>
-          </a:lnRef>
-          <a:fillRef idx="0">
-            <a:schemeClr val="accent1"/>
-          </a:fillRef>
-          <a:effectRef idx="0">
-            <a:schemeClr val="accent1"/>
-          </a:effectRef>
-          <a:fontRef idx="minor">
-            <a:schemeClr val="tx1"/>
-          </a:fontRef>
-        </p:style>
-      </p:cxnSp>
-      <p:cxnSp>
-        <p:nvCxnSpPr>
-          <p:cNvPr id="15" name="Straight Arrow Connector 14">
-            <a:extLst>
-              <a:ext uri="{FF2B5EF4-FFF2-40B4-BE49-F238E27FC236}">
-                <a16:creationId xmlns:a16="http://schemas.microsoft.com/office/drawing/2014/main" id="{23CAD27B-D3FA-4326-A243-1D3FC1D5FED3}"/>
-              </a:ext>
-            </a:extLst>
-          </p:cNvPr>
-          <p:cNvCxnSpPr>
-            <a:cxnSpLocks/>
-          </p:cNvCxnSpPr>
-          <p:nvPr/>
-        </p:nvCxnSpPr>
-        <p:spPr>
-          <a:xfrm>
-            <a:off x="3208867" y="3395067"/>
-            <a:ext cx="2159000" cy="433584"/>
+            <a:off x="1461154" y="2620927"/>
+            <a:ext cx="904976" cy="518201"/>
           </a:xfrm>
           <a:prstGeom prst="straightConnector1">
             <a:avLst/>
@@ -6357,9 +6796,9 @@
           <p:nvPr/>
         </p:nvCxnSpPr>
         <p:spPr>
-          <a:xfrm flipH="1">
-            <a:off x="3547533" y="4061749"/>
-            <a:ext cx="2387603" cy="450984"/>
+          <a:xfrm flipV="1">
+            <a:off x="4411744" y="4061749"/>
+            <a:ext cx="1611984" cy="513565"/>
           </a:xfrm>
           <a:prstGeom prst="straightConnector1">
             <a:avLst/>
@@ -6398,9 +6837,91 @@
           <p:nvPr/>
         </p:nvCxnSpPr>
         <p:spPr>
-          <a:xfrm flipV="1">
-            <a:off x="1676402" y="3380845"/>
-            <a:ext cx="304798" cy="416986"/>
+          <a:xfrm>
+            <a:off x="3327662" y="4061749"/>
+            <a:ext cx="141402" cy="513565"/>
+          </a:xfrm>
+          <a:prstGeom prst="straightConnector1">
+            <a:avLst/>
+          </a:prstGeom>
+          <a:ln w="38100">
+            <a:tailEnd type="triangle"/>
+          </a:ln>
+        </p:spPr>
+        <p:style>
+          <a:lnRef idx="1">
+            <a:schemeClr val="accent1"/>
+          </a:lnRef>
+          <a:fillRef idx="0">
+            <a:schemeClr val="accent1"/>
+          </a:fillRef>
+          <a:effectRef idx="0">
+            <a:schemeClr val="accent1"/>
+          </a:effectRef>
+          <a:fontRef idx="minor">
+            <a:schemeClr val="tx1"/>
+          </a:fontRef>
+        </p:style>
+      </p:cxnSp>
+      <p:cxnSp>
+        <p:nvCxnSpPr>
+          <p:cNvPr id="45" name="Straight Arrow Connector 9">
+            <a:extLst>
+              <a:ext uri="{FF2B5EF4-FFF2-40B4-BE49-F238E27FC236}">
+                <a16:creationId xmlns:a16="http://schemas.microsoft.com/office/drawing/2014/main" id="{29483B70-7FE5-42F0-81A5-B2A513214A89}"/>
+              </a:ext>
+            </a:extLst>
+          </p:cNvPr>
+          <p:cNvCxnSpPr>
+            <a:cxnSpLocks/>
+          </p:cNvCxnSpPr>
+          <p:nvPr/>
+        </p:nvCxnSpPr>
+        <p:spPr>
+          <a:xfrm flipH="1" flipV="1">
+            <a:off x="2017336" y="3360108"/>
+            <a:ext cx="525545" cy="514079"/>
+          </a:xfrm>
+          <a:prstGeom prst="straightConnector1">
+            <a:avLst/>
+          </a:prstGeom>
+          <a:ln w="38100">
+            <a:tailEnd type="triangle"/>
+          </a:ln>
+        </p:spPr>
+        <p:style>
+          <a:lnRef idx="1">
+            <a:schemeClr val="accent1"/>
+          </a:lnRef>
+          <a:fillRef idx="0">
+            <a:schemeClr val="accent1"/>
+          </a:fillRef>
+          <a:effectRef idx="0">
+            <a:schemeClr val="accent1"/>
+          </a:effectRef>
+          <a:fontRef idx="minor">
+            <a:schemeClr val="tx1"/>
+          </a:fontRef>
+        </p:style>
+      </p:cxnSp>
+      <p:cxnSp>
+        <p:nvCxnSpPr>
+          <p:cNvPr id="54" name="Straight Arrow Connector 17">
+            <a:extLst>
+              <a:ext uri="{FF2B5EF4-FFF2-40B4-BE49-F238E27FC236}">
+                <a16:creationId xmlns:a16="http://schemas.microsoft.com/office/drawing/2014/main" id="{9EF85164-14B8-4262-A49A-32338041F4DA}"/>
+              </a:ext>
+            </a:extLst>
+          </p:cNvPr>
+          <p:cNvCxnSpPr>
+            <a:cxnSpLocks/>
+          </p:cNvCxnSpPr>
+          <p:nvPr/>
+        </p:nvCxnSpPr>
+        <p:spPr>
+          <a:xfrm>
+            <a:off x="3233395" y="3330588"/>
+            <a:ext cx="2790333" cy="513564"/>
           </a:xfrm>
           <a:prstGeom prst="straightConnector1">
             <a:avLst/>

</xml_diff>